<commit_message>
Correzione del piccolo errore (video successivi -> video correlati
</commit_message>
<xml_diff>
--- a/Materiale/Presentazioni/PPOINT/Presentazione3.pptx
+++ b/Materiale/Presentazioni/PPOINT/Presentazione3.pptx
@@ -356,7 +356,7 @@
           <a:p>
             <a:fld id="{ED291B17-9318-49DB-B28B-6E5994AE9581}" type="datetime1">
               <a:rPr lang="en-US" smtClean="0"/>
-              <a:t>5/29/2021</a:t>
+              <a:t>6/3/2021</a:t>
             </a:fld>
             <a:endParaRPr lang="en-US" dirty="0"/>
           </a:p>
@@ -559,7 +559,7 @@
           <a:p>
             <a:fld id="{2CED4963-E985-44C4-B8C4-FDD613B7C2F8}" type="datetime1">
               <a:rPr lang="en-US" smtClean="0"/>
-              <a:t>5/29/2021</a:t>
+              <a:t>6/3/2021</a:t>
             </a:fld>
             <a:endParaRPr lang="en-US" dirty="0"/>
           </a:p>
@@ -921,7 +921,7 @@
           <a:p>
             <a:fld id="{ED291B17-9318-49DB-B28B-6E5994AE9581}" type="datetime1">
               <a:rPr lang="en-US" smtClean="0"/>
-              <a:t>5/29/2021</a:t>
+              <a:t>6/3/2021</a:t>
             </a:fld>
             <a:endParaRPr lang="en-US" dirty="0"/>
           </a:p>
@@ -1119,7 +1119,7 @@
           <a:p>
             <a:fld id="{78DD82B9-B8EE-4375-B6FF-88FA6ABB15D9}" type="datetime1">
               <a:rPr lang="en-US" smtClean="0"/>
-              <a:t>5/29/2021</a:t>
+              <a:t>6/3/2021</a:t>
             </a:fld>
             <a:endParaRPr lang="en-US" dirty="0"/>
           </a:p>
@@ -1431,7 +1431,7 @@
           <a:p>
             <a:fld id="{B2497495-0637-405E-AE64-5CC7506D51F5}" type="datetime1">
               <a:rPr lang="en-US" smtClean="0"/>
-              <a:t>5/29/2021</a:t>
+              <a:t>6/3/2021</a:t>
             </a:fld>
             <a:endParaRPr lang="en-US" dirty="0"/>
           </a:p>
@@ -1684,7 +1684,7 @@
           <a:p>
             <a:fld id="{7BFFD690-9426-415D-8B65-26881E07B2D4}" type="datetime1">
               <a:rPr lang="en-US" smtClean="0"/>
-              <a:t>5/29/2021</a:t>
+              <a:t>6/3/2021</a:t>
             </a:fld>
             <a:endParaRPr lang="en-US" dirty="0"/>
           </a:p>
@@ -2106,7 +2106,7 @@
           <a:p>
             <a:fld id="{04C4989A-474C-40DE-95B9-011C28B71673}" type="datetime1">
               <a:rPr lang="en-US" smtClean="0"/>
-              <a:t>5/29/2021</a:t>
+              <a:t>6/3/2021</a:t>
             </a:fld>
             <a:endParaRPr lang="en-US" dirty="0"/>
           </a:p>
@@ -2229,7 +2229,7 @@
           <a:p>
             <a:fld id="{5DB4ED54-5B5E-4A04-93D3-5772E3CE3818}" type="datetime1">
               <a:rPr lang="en-US" smtClean="0"/>
-              <a:t>5/29/2021</a:t>
+              <a:t>6/3/2021</a:t>
             </a:fld>
             <a:endParaRPr lang="en-US" dirty="0"/>
           </a:p>
@@ -2324,7 +2324,7 @@
           <a:p>
             <a:fld id="{4EDE50D6-574B-40AF-946F-D52A04ADE379}" type="datetime1">
               <a:rPr lang="en-US" smtClean="0"/>
-              <a:t>5/29/2021</a:t>
+              <a:t>6/3/2021</a:t>
             </a:fld>
             <a:endParaRPr lang="en-US" dirty="0"/>
           </a:p>
@@ -2701,7 +2701,7 @@
           <a:p>
             <a:fld id="{D82884F1-FFEA-405F-9602-3DCA865EDA4E}" type="datetime1">
               <a:rPr lang="en-US" smtClean="0"/>
-              <a:t>5/29/2021</a:t>
+              <a:t>6/3/2021</a:t>
             </a:fld>
             <a:endParaRPr lang="en-US" dirty="0"/>
           </a:p>
@@ -2994,7 +2994,7 @@
           <a:p>
             <a:fld id="{7E18DB4A-8810-4A10-AD5C-D5E2C667F5B3}" type="datetime1">
               <a:rPr lang="en-US" smtClean="0"/>
-              <a:t>5/29/2021</a:t>
+              <a:t>6/3/2021</a:t>
             </a:fld>
             <a:endParaRPr lang="en-US" dirty="0"/>
           </a:p>
@@ -3209,7 +3209,7 @@
           <a:p>
             <a:fld id="{ED291B17-9318-49DB-B28B-6E5994AE9581}" type="datetime1">
               <a:rPr lang="en-US" smtClean="0"/>
-              <a:t>5/29/2021</a:t>
+              <a:t>6/3/2021</a:t>
             </a:fld>
             <a:endParaRPr lang="en-US" dirty="0"/>
           </a:p>
@@ -4326,7 +4326,15 @@
           <a:p>
             <a:r>
               <a:rPr lang="it-IT" dirty="0"/>
-              <a:t>La risposta di questa chiamata è l’oggetto che contiene le informazioni di tutti i video successivi a quello dato come parametro</a:t>
+              <a:t>La risposta di questa chiamata è l’oggetto che contiene le informazioni di tutti i </a:t>
+            </a:r>
+            <a:r>
+              <a:rPr lang="it-IT"/>
+              <a:t>video correlati </a:t>
+            </a:r>
+            <a:r>
+              <a:rPr lang="it-IT" dirty="0"/>
+              <a:t>a quello dato come parametro</a:t>
             </a:r>
           </a:p>
           <a:p>

</xml_diff>